<commit_message>
Update d3 _oops ;added some comments to source files
</commit_message>
<xml_diff>
--- a/slides/3_loops.pptx
+++ b/slides/3_loops.pptx
@@ -216,7 +216,7 @@
           <a:p>
             <a:fld id="{85EF5437-F444-4613-A039-4AD69D91C86A}" type="datetimeFigureOut">
               <a:rPr lang="ru-RU" smtClean="0"/>
-              <a:t>24.09.2023</a:t>
+              <a:t>27.09.2023</a:t>
             </a:fld>
             <a:endParaRPr lang="ru-RU"/>
           </a:p>
@@ -1286,7 +1286,7 @@
           <a:p>
             <a:fld id="{58BF7D01-7D49-4F37-AA30-F04C65571A4A}" type="datetimeFigureOut">
               <a:rPr lang="ru-RU" smtClean="0"/>
-              <a:t>24.09.2023</a:t>
+              <a:t>27.09.2023</a:t>
             </a:fld>
             <a:endParaRPr lang="ru-RU"/>
           </a:p>
@@ -1456,7 +1456,7 @@
           <a:p>
             <a:fld id="{58BF7D01-7D49-4F37-AA30-F04C65571A4A}" type="datetimeFigureOut">
               <a:rPr lang="ru-RU" smtClean="0"/>
-              <a:t>24.09.2023</a:t>
+              <a:t>27.09.2023</a:t>
             </a:fld>
             <a:endParaRPr lang="ru-RU"/>
           </a:p>
@@ -1636,7 +1636,7 @@
           <a:p>
             <a:fld id="{58BF7D01-7D49-4F37-AA30-F04C65571A4A}" type="datetimeFigureOut">
               <a:rPr lang="ru-RU" smtClean="0"/>
-              <a:t>24.09.2023</a:t>
+              <a:t>27.09.2023</a:t>
             </a:fld>
             <a:endParaRPr lang="ru-RU"/>
           </a:p>
@@ -1806,7 +1806,7 @@
           <a:p>
             <a:fld id="{58BF7D01-7D49-4F37-AA30-F04C65571A4A}" type="datetimeFigureOut">
               <a:rPr lang="ru-RU" smtClean="0"/>
-              <a:t>24.09.2023</a:t>
+              <a:t>27.09.2023</a:t>
             </a:fld>
             <a:endParaRPr lang="ru-RU"/>
           </a:p>
@@ -2052,7 +2052,7 @@
           <a:p>
             <a:fld id="{58BF7D01-7D49-4F37-AA30-F04C65571A4A}" type="datetimeFigureOut">
               <a:rPr lang="ru-RU" smtClean="0"/>
-              <a:t>24.09.2023</a:t>
+              <a:t>27.09.2023</a:t>
             </a:fld>
             <a:endParaRPr lang="ru-RU"/>
           </a:p>
@@ -2284,7 +2284,7 @@
           <a:p>
             <a:fld id="{58BF7D01-7D49-4F37-AA30-F04C65571A4A}" type="datetimeFigureOut">
               <a:rPr lang="ru-RU" smtClean="0"/>
-              <a:t>24.09.2023</a:t>
+              <a:t>27.09.2023</a:t>
             </a:fld>
             <a:endParaRPr lang="ru-RU"/>
           </a:p>
@@ -2651,7 +2651,7 @@
           <a:p>
             <a:fld id="{58BF7D01-7D49-4F37-AA30-F04C65571A4A}" type="datetimeFigureOut">
               <a:rPr lang="ru-RU" smtClean="0"/>
-              <a:t>24.09.2023</a:t>
+              <a:t>27.09.2023</a:t>
             </a:fld>
             <a:endParaRPr lang="ru-RU"/>
           </a:p>
@@ -2769,7 +2769,7 @@
           <a:p>
             <a:fld id="{58BF7D01-7D49-4F37-AA30-F04C65571A4A}" type="datetimeFigureOut">
               <a:rPr lang="ru-RU" smtClean="0"/>
-              <a:t>24.09.2023</a:t>
+              <a:t>27.09.2023</a:t>
             </a:fld>
             <a:endParaRPr lang="ru-RU"/>
           </a:p>
@@ -2864,7 +2864,7 @@
           <a:p>
             <a:fld id="{58BF7D01-7D49-4F37-AA30-F04C65571A4A}" type="datetimeFigureOut">
               <a:rPr lang="ru-RU" smtClean="0"/>
-              <a:t>24.09.2023</a:t>
+              <a:t>27.09.2023</a:t>
             </a:fld>
             <a:endParaRPr lang="ru-RU"/>
           </a:p>
@@ -3141,7 +3141,7 @@
           <a:p>
             <a:fld id="{58BF7D01-7D49-4F37-AA30-F04C65571A4A}" type="datetimeFigureOut">
               <a:rPr lang="ru-RU" smtClean="0"/>
-              <a:t>24.09.2023</a:t>
+              <a:t>27.09.2023</a:t>
             </a:fld>
             <a:endParaRPr lang="ru-RU"/>
           </a:p>
@@ -3398,7 +3398,7 @@
           <a:p>
             <a:fld id="{58BF7D01-7D49-4F37-AA30-F04C65571A4A}" type="datetimeFigureOut">
               <a:rPr lang="ru-RU" smtClean="0"/>
-              <a:t>24.09.2023</a:t>
+              <a:t>27.09.2023</a:t>
             </a:fld>
             <a:endParaRPr lang="ru-RU"/>
           </a:p>
@@ -3611,7 +3611,7 @@
           <a:p>
             <a:fld id="{58BF7D01-7D49-4F37-AA30-F04C65571A4A}" type="datetimeFigureOut">
               <a:rPr lang="ru-RU" smtClean="0"/>
-              <a:t>24.09.2023</a:t>
+              <a:t>27.09.2023</a:t>
             </a:fld>
             <a:endParaRPr lang="ru-RU"/>
           </a:p>
@@ -4410,7 +4410,7 @@
                 <a:latin typeface="Times New Roman" panose="02020603050405020304" pitchFamily="18" charset="0"/>
                 <a:cs typeface="Times New Roman" panose="02020603050405020304" pitchFamily="18" charset="0"/>
               </a:rPr>
-              <a:t>	k++;</a:t>
+              <a:t>	k = k + 1;</a:t>
             </a:r>
           </a:p>
           <a:p>
@@ -4739,7 +4739,7 @@
         <p:spPr>
           <a:xfrm>
             <a:off x="2853725" y="2274838"/>
-            <a:ext cx="6484547" cy="2308324"/>
+            <a:ext cx="6484547" cy="1754326"/>
           </a:xfrm>
           <a:prstGeom prst="rect">
             <a:avLst/>
@@ -4813,30 +4813,7 @@
                 <a:latin typeface="Times New Roman" panose="02020603050405020304" pitchFamily="18" charset="0"/>
                 <a:cs typeface="Times New Roman" panose="02020603050405020304" pitchFamily="18" charset="0"/>
               </a:rPr>
-              <a:t> + 1) // </a:t>
-            </a:r>
-            <a:r>
-              <a:rPr lang="en-US" sz="3600" dirty="0" err="1">
-                <a:latin typeface="Times New Roman" panose="02020603050405020304" pitchFamily="18" charset="0"/>
-                <a:cs typeface="Times New Roman" panose="02020603050405020304" pitchFamily="18" charset="0"/>
-              </a:rPr>
-              <a:t>i</a:t>
-            </a:r>
-            <a:r>
-              <a:rPr lang="en-US" sz="3600" dirty="0">
-                <a:latin typeface="Times New Roman" panose="02020603050405020304" pitchFamily="18" charset="0"/>
-                <a:cs typeface="Times New Roman" panose="02020603050405020304" pitchFamily="18" charset="0"/>
-              </a:rPr>
-              <a:t>++</a:t>
-            </a:r>
-          </a:p>
-          <a:p>
-            <a:r>
-              <a:rPr lang="en-US" sz="3600" dirty="0">
-                <a:latin typeface="Times New Roman" panose="02020603050405020304" pitchFamily="18" charset="0"/>
-                <a:cs typeface="Times New Roman" panose="02020603050405020304" pitchFamily="18" charset="0"/>
-              </a:rPr>
-              <a:t>{</a:t>
+              <a:t> + 1){</a:t>
             </a:r>
           </a:p>
           <a:p>

</xml_diff>